<commit_message>
Began cleaning up with comments
</commit_message>
<xml_diff>
--- a/Database Final Presentation.pptx
+++ b/Database Final Presentation.pptx
@@ -10,6 +10,8 @@
     <p:sldId id="258" r:id="rId4"/>
     <p:sldId id="259" r:id="rId5"/>
     <p:sldId id="260" r:id="rId6"/>
+    <p:sldId id="261" r:id="rId7"/>
+    <p:sldId id="262" r:id="rId8"/>
   </p:sldIdLst>
   <p:sldSz cx="12192000" cy="6858000"/>
   <p:notesSz cx="6858000" cy="9144000"/>
@@ -6350,7 +6352,7 @@
           </a:effectLst>
           <a:extLst>
             <a:ext uri="{91240B29-F687-4f45-9708-019B960494DF}">
-              <a14:hiddenLine xmlns:a14="http://schemas.microsoft.com/office/drawing/2010/main" xmlns:p14="http://schemas.microsoft.com/office/powerpoint/2010/main" xmlns:a16="http://schemas.microsoft.com/office/drawing/2014/main" xmlns="" w="9525">
+              <a14:hiddenLine xmlns="" xmlns:a16="http://schemas.microsoft.com/office/drawing/2014/main" xmlns:p14="http://schemas.microsoft.com/office/powerpoint/2010/main" xmlns:a14="http://schemas.microsoft.com/office/drawing/2010/main" w="9525">
                 <a:solidFill>
                   <a:srgbClr val="000000"/>
                 </a:solidFill>
@@ -7327,6 +7329,25 @@
 <file path=ppt/slides/slide5.xml><?xml version="1.0" encoding="utf-8"?>
 <p:sld xmlns:a="http://schemas.openxmlformats.org/drawingml/2006/main" xmlns:r="http://schemas.openxmlformats.org/officeDocument/2006/relationships" xmlns:p="http://schemas.openxmlformats.org/presentationml/2006/main">
   <p:cSld>
+    <p:bg>
+      <p:bgPr>
+        <a:blipFill rotWithShape="1">
+          <a:blip r:embed="rId2">
+            <a:duotone>
+              <a:schemeClr val="bg1">
+                <a:shade val="80000"/>
+                <a:lumMod val="80000"/>
+              </a:schemeClr>
+              <a:schemeClr val="bg1">
+                <a:tint val="98000"/>
+              </a:schemeClr>
+            </a:duotone>
+          </a:blip>
+          <a:stretch/>
+        </a:blipFill>
+        <a:effectLst/>
+      </p:bgPr>
+    </p:bg>
     <p:spTree>
       <p:nvGrpSpPr>
         <p:cNvPr id="1" name=""/>
@@ -7341,6 +7362,66 @@
           <a:chExt cx="0" cy="0"/>
         </a:xfrm>
       </p:grpSpPr>
+      <p:sp useBgFill="1">
+        <p:nvSpPr>
+          <p:cNvPr id="10" name="Rectangle 9">
+            <a:extLst>
+              <a:ext uri="{FF2B5EF4-FFF2-40B4-BE49-F238E27FC236}">
+                <a16:creationId xmlns:a16="http://schemas.microsoft.com/office/drawing/2014/main" id="{1E70A317-DCED-4E80-AA2D-467D8702E5CB}"/>
+              </a:ext>
+              <a:ext uri="{C183D7F6-B498-43B3-948B-1728B52AA6E4}">
+                <adec:decorative xmlns:adec="http://schemas.microsoft.com/office/drawing/2017/decorative" val="1"/>
+              </a:ext>
+            </a:extLst>
+          </p:cNvPr>
+          <p:cNvSpPr>
+            <a:spLocks noGrp="1" noRot="1" noChangeAspect="1" noMove="1" noResize="1" noEditPoints="1" noAdjustHandles="1" noChangeArrowheads="1" noChangeShapeType="1" noTextEdit="1"/>
+          </p:cNvSpPr>
+          <p:nvPr>
+            <p:extLst>
+              <p:ext uri="{386F3935-93C4-4BCD-93E2-E3B085C9AB24}">
+                <p16:designElem xmlns:p16="http://schemas.microsoft.com/office/powerpoint/2015/main" val="1"/>
+              </p:ext>
+            </p:extLst>
+          </p:nvPr>
+        </p:nvSpPr>
+        <p:spPr>
+          <a:xfrm>
+            <a:off x="0" y="0"/>
+            <a:ext cx="12192000" cy="6858000"/>
+          </a:xfrm>
+          <a:prstGeom prst="rect">
+            <a:avLst/>
+          </a:prstGeom>
+          <a:ln>
+            <a:noFill/>
+          </a:ln>
+        </p:spPr>
+        <p:style>
+          <a:lnRef idx="2">
+            <a:schemeClr val="accent1">
+              <a:shade val="50000"/>
+            </a:schemeClr>
+          </a:lnRef>
+          <a:fillRef idx="1">
+            <a:schemeClr val="accent1"/>
+          </a:fillRef>
+          <a:effectRef idx="0">
+            <a:schemeClr val="accent1"/>
+          </a:effectRef>
+          <a:fontRef idx="minor">
+            <a:schemeClr val="lt1"/>
+          </a:fontRef>
+        </p:style>
+        <p:txBody>
+          <a:bodyPr rtlCol="0" anchor="ctr"/>
+          <a:lstStyle/>
+          <a:p>
+            <a:pPr algn="ctr"/>
+            <a:endParaRPr lang="en-US"/>
+          </a:p>
+        </p:txBody>
+      </p:sp>
       <p:sp>
         <p:nvSpPr>
           <p:cNvPr id="2" name="Title 1">
@@ -7357,13 +7438,20 @@
             <p:ph type="title"/>
           </p:nvPr>
         </p:nvSpPr>
-        <p:spPr/>
-        <p:txBody>
-          <a:bodyPr/>
+        <p:spPr>
+          <a:xfrm>
+            <a:off x="861791" y="835383"/>
+            <a:ext cx="3382832" cy="3499549"/>
+          </a:xfrm>
+        </p:spPr>
+        <p:txBody>
+          <a:bodyPr vert="horz" lIns="91440" tIns="45720" rIns="91440" bIns="45720" rtlCol="0" anchor="b">
+            <a:normAutofit/>
+          </a:bodyPr>
           <a:lstStyle/>
           <a:p>
             <a:r>
-              <a:rPr lang="en-US" dirty="0"/>
+              <a:rPr lang="en-US" sz="4200" dirty="0"/>
               <a:t>UML Diagram</a:t>
             </a:r>
           </a:p>
@@ -7371,33 +7459,407 @@
       </p:sp>
       <p:sp>
         <p:nvSpPr>
-          <p:cNvPr id="3" name="Content Placeholder 2">
+          <p:cNvPr id="12" name="Rectangle 11">
             <a:extLst>
               <a:ext uri="{FF2B5EF4-FFF2-40B4-BE49-F238E27FC236}">
-                <a16:creationId xmlns:a16="http://schemas.microsoft.com/office/drawing/2014/main" id="{17618E93-05DC-780C-5FE4-5EEB8A3E954C}"/>
+                <a16:creationId xmlns:a16="http://schemas.microsoft.com/office/drawing/2014/main" id="{A6D87845-294F-40CB-BC48-46455460D292}"/>
+              </a:ext>
+              <a:ext uri="{C183D7F6-B498-43B3-948B-1728B52AA6E4}">
+                <adec:decorative xmlns:adec="http://schemas.microsoft.com/office/drawing/2017/decorative" val="1"/>
               </a:ext>
             </a:extLst>
           </p:cNvPr>
           <p:cNvSpPr>
-            <a:spLocks noGrp="1"/>
-          </p:cNvSpPr>
+            <a:spLocks noGrp="1" noRot="1" noChangeAspect="1" noMove="1" noResize="1" noEditPoints="1" noAdjustHandles="1" noChangeArrowheads="1" noChangeShapeType="1" noTextEdit="1"/>
+          </p:cNvSpPr>
+          <p:nvPr>
+            <p:extLst>
+              <p:ext uri="{386F3935-93C4-4BCD-93E2-E3B085C9AB24}">
+                <p16:designElem xmlns:p16="http://schemas.microsoft.com/office/powerpoint/2015/main" val="1"/>
+              </p:ext>
+            </p:extLst>
+          </p:nvPr>
+        </p:nvSpPr>
+        <p:spPr>
+          <a:xfrm>
+            <a:off x="4655671" y="0"/>
+            <a:ext cx="7536329" cy="6858000"/>
+          </a:xfrm>
+          <a:prstGeom prst="rect">
+            <a:avLst/>
+          </a:prstGeom>
+          <a:solidFill>
+            <a:schemeClr val="tx1"/>
+          </a:solidFill>
+          <a:ln>
+            <a:noFill/>
+          </a:ln>
+        </p:spPr>
+        <p:style>
+          <a:lnRef idx="2">
+            <a:schemeClr val="accent1">
+              <a:shade val="50000"/>
+            </a:schemeClr>
+          </a:lnRef>
+          <a:fillRef idx="1">
+            <a:schemeClr val="accent1"/>
+          </a:fillRef>
+          <a:effectRef idx="0">
+            <a:schemeClr val="accent1"/>
+          </a:effectRef>
+          <a:fontRef idx="minor">
+            <a:schemeClr val="lt1"/>
+          </a:fontRef>
+        </p:style>
+        <p:txBody>
+          <a:bodyPr rtlCol="0" anchor="ctr"/>
+          <a:lstStyle/>
+          <a:p>
+            <a:pPr algn="ctr"/>
+            <a:endParaRPr lang="en-US"/>
+          </a:p>
+        </p:txBody>
+      </p:sp>
+      <p:pic>
+        <p:nvPicPr>
+          <p:cNvPr id="5" name="Content Placeholder 4">
+            <a:extLst>
+              <a:ext uri="{FF2B5EF4-FFF2-40B4-BE49-F238E27FC236}">
+                <a16:creationId xmlns:a16="http://schemas.microsoft.com/office/drawing/2014/main" id="{8C563CC9-5557-91B4-B8A5-3E081BC88DEF}"/>
+              </a:ext>
+            </a:extLst>
+          </p:cNvPr>
+          <p:cNvPicPr>
+            <a:picLocks noGrp="1" noChangeAspect="1"/>
+          </p:cNvPicPr>
           <p:nvPr>
             <p:ph idx="1"/>
           </p:nvPr>
-        </p:nvSpPr>
-        <p:spPr/>
-        <p:txBody>
-          <a:bodyPr/>
-          <a:lstStyle/>
-          <a:p>
-            <a:endParaRPr lang="en-US"/>
-          </a:p>
-        </p:txBody>
-      </p:sp>
+        </p:nvPicPr>
+        <p:blipFill>
+          <a:blip r:embed="rId3"/>
+          <a:stretch>
+            <a:fillRect/>
+          </a:stretch>
+        </p:blipFill>
+        <p:spPr>
+          <a:xfrm>
+            <a:off x="5324315" y="1197840"/>
+            <a:ext cx="6197668" cy="4462320"/>
+          </a:xfrm>
+          <a:prstGeom prst="rect">
+            <a:avLst/>
+          </a:prstGeom>
+        </p:spPr>
+      </p:pic>
     </p:spTree>
     <p:extLst>
       <p:ext uri="{BB962C8B-B14F-4D97-AF65-F5344CB8AC3E}">
         <p14:creationId xmlns:p14="http://schemas.microsoft.com/office/powerpoint/2010/main" val="3920176657"/>
+      </p:ext>
+    </p:extLst>
+  </p:cSld>
+  <p:clrMapOvr>
+    <a:masterClrMapping/>
+  </p:clrMapOvr>
+</p:sld>
+</file>
+
+<file path=ppt/slides/slide6.xml><?xml version="1.0" encoding="utf-8"?>
+<p:sld xmlns:a="http://schemas.openxmlformats.org/drawingml/2006/main" xmlns:r="http://schemas.openxmlformats.org/officeDocument/2006/relationships" xmlns:p="http://schemas.openxmlformats.org/presentationml/2006/main">
+  <p:cSld>
+    <p:bg>
+      <p:bgPr>
+        <a:blipFill rotWithShape="1">
+          <a:blip r:embed="rId2">
+            <a:duotone>
+              <a:schemeClr val="bg1">
+                <a:shade val="80000"/>
+                <a:lumMod val="80000"/>
+              </a:schemeClr>
+              <a:schemeClr val="bg1">
+                <a:tint val="98000"/>
+              </a:schemeClr>
+            </a:duotone>
+          </a:blip>
+          <a:stretch/>
+        </a:blipFill>
+        <a:effectLst/>
+      </p:bgPr>
+    </p:bg>
+    <p:spTree>
+      <p:nvGrpSpPr>
+        <p:cNvPr id="1" name=""/>
+        <p:cNvGrpSpPr/>
+        <p:nvPr/>
+      </p:nvGrpSpPr>
+      <p:grpSpPr>
+        <a:xfrm>
+          <a:off x="0" y="0"/>
+          <a:ext cx="0" cy="0"/>
+          <a:chOff x="0" y="0"/>
+          <a:chExt cx="0" cy="0"/>
+        </a:xfrm>
+      </p:grpSpPr>
+      <p:sp useBgFill="1">
+        <p:nvSpPr>
+          <p:cNvPr id="10" name="Rectangle 9">
+            <a:extLst>
+              <a:ext uri="{FF2B5EF4-FFF2-40B4-BE49-F238E27FC236}">
+                <a16:creationId xmlns:a16="http://schemas.microsoft.com/office/drawing/2014/main" id="{1E70A317-DCED-4E80-AA2D-467D8702E5CB}"/>
+              </a:ext>
+              <a:ext uri="{C183D7F6-B498-43B3-948B-1728B52AA6E4}">
+                <adec:decorative xmlns:adec="http://schemas.microsoft.com/office/drawing/2017/decorative" val="1"/>
+              </a:ext>
+            </a:extLst>
+          </p:cNvPr>
+          <p:cNvSpPr>
+            <a:spLocks noGrp="1" noRot="1" noChangeAspect="1" noMove="1" noResize="1" noEditPoints="1" noAdjustHandles="1" noChangeArrowheads="1" noChangeShapeType="1" noTextEdit="1"/>
+          </p:cNvSpPr>
+          <p:nvPr>
+            <p:extLst>
+              <p:ext uri="{386F3935-93C4-4BCD-93E2-E3B085C9AB24}">
+                <p16:designElem xmlns:p16="http://schemas.microsoft.com/office/powerpoint/2015/main" val="1"/>
+              </p:ext>
+            </p:extLst>
+          </p:nvPr>
+        </p:nvSpPr>
+        <p:spPr>
+          <a:xfrm>
+            <a:off x="0" y="0"/>
+            <a:ext cx="12192000" cy="6858000"/>
+          </a:xfrm>
+          <a:prstGeom prst="rect">
+            <a:avLst/>
+          </a:prstGeom>
+          <a:ln>
+            <a:noFill/>
+          </a:ln>
+        </p:spPr>
+        <p:style>
+          <a:lnRef idx="2">
+            <a:schemeClr val="accent1">
+              <a:shade val="50000"/>
+            </a:schemeClr>
+          </a:lnRef>
+          <a:fillRef idx="1">
+            <a:schemeClr val="accent1"/>
+          </a:fillRef>
+          <a:effectRef idx="0">
+            <a:schemeClr val="accent1"/>
+          </a:effectRef>
+          <a:fontRef idx="minor">
+            <a:schemeClr val="lt1"/>
+          </a:fontRef>
+        </p:style>
+        <p:txBody>
+          <a:bodyPr rtlCol="0" anchor="ctr"/>
+          <a:lstStyle/>
+          <a:p>
+            <a:pPr algn="ctr"/>
+            <a:endParaRPr lang="en-US"/>
+          </a:p>
+        </p:txBody>
+      </p:sp>
+      <p:sp>
+        <p:nvSpPr>
+          <p:cNvPr id="2" name="Title 1">
+            <a:extLst>
+              <a:ext uri="{FF2B5EF4-FFF2-40B4-BE49-F238E27FC236}">
+                <a16:creationId xmlns:a16="http://schemas.microsoft.com/office/drawing/2014/main" id="{45BC7916-F68E-8E2B-8872-9FB219463108}"/>
+              </a:ext>
+            </a:extLst>
+          </p:cNvPr>
+          <p:cNvSpPr>
+            <a:spLocks noGrp="1"/>
+          </p:cNvSpPr>
+          <p:nvPr>
+            <p:ph type="title"/>
+          </p:nvPr>
+        </p:nvSpPr>
+        <p:spPr>
+          <a:xfrm>
+            <a:off x="861791" y="835383"/>
+            <a:ext cx="3382832" cy="3499549"/>
+          </a:xfrm>
+        </p:spPr>
+        <p:txBody>
+          <a:bodyPr vert="horz" lIns="91440" tIns="45720" rIns="91440" bIns="45720" rtlCol="0" anchor="b">
+            <a:normAutofit/>
+          </a:bodyPr>
+          <a:lstStyle/>
+          <a:p>
+            <a:r>
+              <a:rPr lang="en-US" sz="4200" dirty="0"/>
+              <a:t>UML Diagram (Continued)</a:t>
+            </a:r>
+          </a:p>
+        </p:txBody>
+      </p:sp>
+      <p:sp>
+        <p:nvSpPr>
+          <p:cNvPr id="12" name="Rectangle 11">
+            <a:extLst>
+              <a:ext uri="{FF2B5EF4-FFF2-40B4-BE49-F238E27FC236}">
+                <a16:creationId xmlns:a16="http://schemas.microsoft.com/office/drawing/2014/main" id="{A6D87845-294F-40CB-BC48-46455460D292}"/>
+              </a:ext>
+              <a:ext uri="{C183D7F6-B498-43B3-948B-1728B52AA6E4}">
+                <adec:decorative xmlns:adec="http://schemas.microsoft.com/office/drawing/2017/decorative" val="1"/>
+              </a:ext>
+            </a:extLst>
+          </p:cNvPr>
+          <p:cNvSpPr>
+            <a:spLocks noGrp="1" noRot="1" noChangeAspect="1" noMove="1" noResize="1" noEditPoints="1" noAdjustHandles="1" noChangeArrowheads="1" noChangeShapeType="1" noTextEdit="1"/>
+          </p:cNvSpPr>
+          <p:nvPr>
+            <p:extLst>
+              <p:ext uri="{386F3935-93C4-4BCD-93E2-E3B085C9AB24}">
+                <p16:designElem xmlns:p16="http://schemas.microsoft.com/office/powerpoint/2015/main" val="1"/>
+              </p:ext>
+            </p:extLst>
+          </p:nvPr>
+        </p:nvSpPr>
+        <p:spPr>
+          <a:xfrm>
+            <a:off x="4655671" y="0"/>
+            <a:ext cx="7536329" cy="6858000"/>
+          </a:xfrm>
+          <a:prstGeom prst="rect">
+            <a:avLst/>
+          </a:prstGeom>
+          <a:solidFill>
+            <a:schemeClr val="tx1"/>
+          </a:solidFill>
+          <a:ln>
+            <a:noFill/>
+          </a:ln>
+        </p:spPr>
+        <p:style>
+          <a:lnRef idx="2">
+            <a:schemeClr val="accent1">
+              <a:shade val="50000"/>
+            </a:schemeClr>
+          </a:lnRef>
+          <a:fillRef idx="1">
+            <a:schemeClr val="accent1"/>
+          </a:fillRef>
+          <a:effectRef idx="0">
+            <a:schemeClr val="accent1"/>
+          </a:effectRef>
+          <a:fontRef idx="minor">
+            <a:schemeClr val="lt1"/>
+          </a:fontRef>
+        </p:style>
+        <p:txBody>
+          <a:bodyPr rtlCol="0" anchor="ctr"/>
+          <a:lstStyle/>
+          <a:p>
+            <a:pPr algn="ctr"/>
+            <a:endParaRPr lang="en-US"/>
+          </a:p>
+        </p:txBody>
+      </p:sp>
+      <p:pic>
+        <p:nvPicPr>
+          <p:cNvPr id="5" name="Content Placeholder 4">
+            <a:extLst>
+              <a:ext uri="{FF2B5EF4-FFF2-40B4-BE49-F238E27FC236}">
+                <a16:creationId xmlns:a16="http://schemas.microsoft.com/office/drawing/2014/main" id="{B424F3F8-E941-B945-34FE-6F720EB074A4}"/>
+              </a:ext>
+            </a:extLst>
+          </p:cNvPr>
+          <p:cNvPicPr>
+            <a:picLocks noGrp="1" noChangeAspect="1"/>
+          </p:cNvPicPr>
+          <p:nvPr>
+            <p:ph idx="1"/>
+          </p:nvPr>
+        </p:nvPicPr>
+        <p:blipFill>
+          <a:blip r:embed="rId3"/>
+          <a:stretch>
+            <a:fillRect/>
+          </a:stretch>
+        </p:blipFill>
+        <p:spPr>
+          <a:xfrm>
+            <a:off x="5324315" y="1631677"/>
+            <a:ext cx="6197668" cy="3594646"/>
+          </a:xfrm>
+          <a:prstGeom prst="rect">
+            <a:avLst/>
+          </a:prstGeom>
+        </p:spPr>
+      </p:pic>
+    </p:spTree>
+    <p:extLst>
+      <p:ext uri="{BB962C8B-B14F-4D97-AF65-F5344CB8AC3E}">
+        <p14:creationId xmlns:p14="http://schemas.microsoft.com/office/powerpoint/2010/main" val="695932443"/>
+      </p:ext>
+    </p:extLst>
+  </p:cSld>
+  <p:clrMapOvr>
+    <a:masterClrMapping/>
+  </p:clrMapOvr>
+</p:sld>
+</file>
+
+<file path=ppt/slides/slide7.xml><?xml version="1.0" encoding="utf-8"?>
+<p:sld xmlns:a="http://schemas.openxmlformats.org/drawingml/2006/main" xmlns:r="http://schemas.openxmlformats.org/officeDocument/2006/relationships" xmlns:p="http://schemas.openxmlformats.org/presentationml/2006/main">
+  <p:cSld>
+    <p:spTree>
+      <p:nvGrpSpPr>
+        <p:cNvPr id="1" name=""/>
+        <p:cNvGrpSpPr/>
+        <p:nvPr/>
+      </p:nvGrpSpPr>
+      <p:grpSpPr>
+        <a:xfrm>
+          <a:off x="0" y="0"/>
+          <a:ext cx="0" cy="0"/>
+          <a:chOff x="0" y="0"/>
+          <a:chExt cx="0" cy="0"/>
+        </a:xfrm>
+      </p:grpSpPr>
+      <p:sp>
+        <p:nvSpPr>
+          <p:cNvPr id="2" name="Title 1">
+            <a:extLst>
+              <a:ext uri="{FF2B5EF4-FFF2-40B4-BE49-F238E27FC236}">
+                <a16:creationId xmlns:a16="http://schemas.microsoft.com/office/drawing/2014/main" id="{5BB5083C-EB32-B93E-2E35-E29CF2BC9E5C}"/>
+              </a:ext>
+            </a:extLst>
+          </p:cNvPr>
+          <p:cNvSpPr>
+            <a:spLocks noGrp="1"/>
+          </p:cNvSpPr>
+          <p:nvPr>
+            <p:ph type="title"/>
+          </p:nvPr>
+        </p:nvSpPr>
+        <p:spPr>
+          <a:xfrm>
+            <a:off x="919119" y="2800350"/>
+            <a:ext cx="10353762" cy="1257300"/>
+          </a:xfrm>
+        </p:spPr>
+        <p:txBody>
+          <a:bodyPr>
+            <a:noAutofit/>
+          </a:bodyPr>
+          <a:lstStyle/>
+          <a:p>
+            <a:r>
+              <a:rPr lang="en-US" sz="8800" dirty="0"/>
+              <a:t>Thank You</a:t>
+            </a:r>
+          </a:p>
+        </p:txBody>
+      </p:sp>
+    </p:spTree>
+    <p:extLst>
+      <p:ext uri="{BB962C8B-B14F-4D97-AF65-F5344CB8AC3E}">
+        <p14:creationId xmlns:p14="http://schemas.microsoft.com/office/powerpoint/2010/main" val="3779511209"/>
       </p:ext>
     </p:extLst>
   </p:cSld>

</xml_diff>

<commit_message>
Added more details in README.md
</commit_message>
<xml_diff>
--- a/Database Final Presentation.pptx
+++ b/Database Final Presentation.pptx
@@ -311,7 +311,7 @@
           <a:p>
             <a:fld id="{88D38747-4367-4BD2-8D51-C97E202738E2}" type="datetime1">
               <a:rPr lang="en-US" smtClean="0"/>
-              <a:t>12/13/2022</a:t>
+              <a:t>12/15/2022</a:t>
             </a:fld>
             <a:endParaRPr lang="en-US" dirty="0"/>
           </a:p>
@@ -616,7 +616,7 @@
           <a:p>
             <a:fld id="{11F1B079-7EF0-44EE-B798-BCC497C9F3B2}" type="datetime1">
               <a:rPr lang="en-US" smtClean="0"/>
-              <a:t>12/13/2022</a:t>
+              <a:t>12/15/2022</a:t>
             </a:fld>
             <a:endParaRPr lang="en-US" dirty="0"/>
           </a:p>
@@ -810,7 +810,7 @@
           <a:p>
             <a:fld id="{28FF70A8-1D13-4657-95F0-A9EA54967B8D}" type="datetime1">
               <a:rPr lang="en-US" smtClean="0"/>
-              <a:t>12/13/2022</a:t>
+              <a:t>12/15/2022</a:t>
             </a:fld>
             <a:endParaRPr lang="en-US" dirty="0"/>
           </a:p>
@@ -1073,7 +1073,7 @@
           <a:p>
             <a:fld id="{21EB90AC-71BD-4C7F-8ACA-7B3F18292E63}" type="datetime1">
               <a:rPr lang="en-US" smtClean="0"/>
-              <a:t>12/13/2022</a:t>
+              <a:t>12/15/2022</a:t>
             </a:fld>
             <a:endParaRPr lang="en-US" dirty="0"/>
           </a:p>
@@ -1509,7 +1509,7 @@
           <a:p>
             <a:fld id="{4E6EFC2C-8905-46F0-B443-CE905B76BA01}" type="datetime1">
               <a:rPr lang="en-US" smtClean="0"/>
-              <a:t>12/13/2022</a:t>
+              <a:t>12/15/2022</a:t>
             </a:fld>
             <a:endParaRPr lang="en-US" dirty="0"/>
           </a:p>
@@ -2046,7 +2046,7 @@
           <a:p>
             <a:fld id="{D9079DC3-C9B5-499E-9140-0DC28B7074E2}" type="datetime1">
               <a:rPr lang="en-US" smtClean="0"/>
-              <a:t>12/13/2022</a:t>
+              <a:t>12/15/2022</a:t>
             </a:fld>
             <a:endParaRPr lang="en-US" dirty="0"/>
           </a:p>
@@ -2928,7 +2928,7 @@
           <a:p>
             <a:fld id="{30BB33EA-E472-4D22-9C03-A9C14AA21CED}" type="datetime1">
               <a:rPr lang="en-US" smtClean="0"/>
-              <a:t>12/13/2022</a:t>
+              <a:t>12/15/2022</a:t>
             </a:fld>
             <a:endParaRPr lang="en-US" dirty="0"/>
           </a:p>
@@ -3098,7 +3098,7 @@
           <a:p>
             <a:fld id="{217E833E-1B6D-415F-AD29-75AE8C43BD0D}" type="datetime1">
               <a:rPr lang="en-US" smtClean="0"/>
-              <a:t>12/13/2022</a:t>
+              <a:t>12/15/2022</a:t>
             </a:fld>
             <a:endParaRPr lang="en-US" dirty="0"/>
           </a:p>
@@ -3282,7 +3282,7 @@
           <a:p>
             <a:fld id="{8452596F-08A7-4B70-989A-F2B1CF31E66B}" type="datetime1">
               <a:rPr lang="en-US" smtClean="0"/>
-              <a:t>12/13/2022</a:t>
+              <a:t>12/15/2022</a:t>
             </a:fld>
             <a:endParaRPr lang="en-US" dirty="0"/>
           </a:p>
@@ -3452,7 +3452,7 @@
           <a:p>
             <a:fld id="{73C55A3C-5767-4844-A0A3-83778C2E5409}" type="datetime1">
               <a:rPr lang="en-US" smtClean="0"/>
-              <a:t>12/13/2022</a:t>
+              <a:t>12/15/2022</a:t>
             </a:fld>
             <a:endParaRPr lang="en-US" dirty="0"/>
           </a:p>
@@ -3696,7 +3696,7 @@
           <a:p>
             <a:fld id="{CAE507A8-A5CF-4D38-AB86-7EDDA87A85D4}" type="datetime1">
               <a:rPr lang="en-US" smtClean="0"/>
-              <a:t>12/13/2022</a:t>
+              <a:t>12/15/2022</a:t>
             </a:fld>
             <a:endParaRPr lang="en-US" dirty="0"/>
           </a:p>
@@ -3938,7 +3938,7 @@
           <a:p>
             <a:fld id="{BDFCD27C-8599-43EF-BA1D-14DDC1946E06}" type="datetime1">
               <a:rPr lang="en-US" smtClean="0"/>
-              <a:t>12/13/2022</a:t>
+              <a:t>12/15/2022</a:t>
             </a:fld>
             <a:endParaRPr lang="en-US" dirty="0"/>
           </a:p>
@@ -4419,7 +4419,7 @@
           <a:p>
             <a:fld id="{49343D99-809A-49C0-96E5-4250D0B498EE}" type="datetime1">
               <a:rPr lang="en-US" smtClean="0"/>
-              <a:t>12/13/2022</a:t>
+              <a:t>12/15/2022</a:t>
             </a:fld>
             <a:endParaRPr lang="en-US" dirty="0"/>
           </a:p>
@@ -4537,7 +4537,7 @@
           <a:p>
             <a:fld id="{A143DE9B-B678-4EFB-BB7D-A4370204A0B0}" type="datetime1">
               <a:rPr lang="en-US" smtClean="0"/>
-              <a:t>12/13/2022</a:t>
+              <a:t>12/15/2022</a:t>
             </a:fld>
             <a:endParaRPr lang="en-US" dirty="0"/>
           </a:p>
@@ -4632,7 +4632,7 @@
           <a:p>
             <a:fld id="{E68812DA-F765-4142-A6A3-A8ED7235E082}" type="datetime1">
               <a:rPr lang="en-US" smtClean="0"/>
-              <a:t>12/13/2022</a:t>
+              <a:t>12/15/2022</a:t>
             </a:fld>
             <a:endParaRPr lang="en-US" dirty="0"/>
           </a:p>
@@ -4887,7 +4887,7 @@
           <a:p>
             <a:fld id="{3E0277FD-7DE6-41D4-930D-AC99F5AFE54E}" type="datetime1">
               <a:rPr lang="en-US" smtClean="0"/>
-              <a:t>12/13/2022</a:t>
+              <a:t>12/15/2022</a:t>
             </a:fld>
             <a:endParaRPr lang="en-US" dirty="0"/>
           </a:p>
@@ -5194,7 +5194,7 @@
           <a:p>
             <a:fld id="{9EA15526-7079-4B7B-987C-1B5FAE11A0FF}" type="datetime1">
               <a:rPr lang="en-US" smtClean="0"/>
-              <a:t>12/13/2022</a:t>
+              <a:t>12/15/2022</a:t>
             </a:fld>
             <a:endParaRPr lang="en-US" dirty="0"/>
           </a:p>
@@ -5429,7 +5429,7 @@
           <a:p>
             <a:fld id="{073ED0CC-082F-4160-86E5-0D6041F12778}" type="datetime1">
               <a:rPr lang="en-US" smtClean="0"/>
-              <a:t>12/13/2022</a:t>
+              <a:t>12/15/2022</a:t>
             </a:fld>
             <a:endParaRPr lang="en-US" dirty="0"/>
           </a:p>
@@ -6352,7 +6352,7 @@
           </a:effectLst>
           <a:extLst>
             <a:ext uri="{91240B29-F687-4f45-9708-019B960494DF}">
-              <a14:hiddenLine xmlns="" xmlns:a16="http://schemas.microsoft.com/office/drawing/2014/main" xmlns:p14="http://schemas.microsoft.com/office/powerpoint/2010/main" xmlns:a14="http://schemas.microsoft.com/office/drawing/2010/main" w="9525">
+              <a14:hiddenLine xmlns:a14="http://schemas.microsoft.com/office/drawing/2010/main" xmlns:p14="http://schemas.microsoft.com/office/powerpoint/2010/main" xmlns:a16="http://schemas.microsoft.com/office/drawing/2014/main" xmlns="" w="9525">
                 <a:solidFill>
                   <a:srgbClr val="000000"/>
                 </a:solidFill>
@@ -7034,7 +7034,7 @@
         </p:spPr>
         <p:txBody>
           <a:bodyPr anchor="ctr">
-            <a:normAutofit fontScale="70000" lnSpcReduction="20000"/>
+            <a:normAutofit fontScale="62500" lnSpcReduction="20000"/>
           </a:bodyPr>
           <a:lstStyle/>
           <a:p>
@@ -7068,6 +7068,17 @@
             <a:r>
               <a:rPr lang="en-US" sz="3100" dirty="0"/>
               <a:t>40+ Maps</a:t>
+            </a:r>
+          </a:p>
+          <a:p>
+            <a:pPr>
+              <a:lnSpc>
+                <a:spcPct val="100000"/>
+              </a:lnSpc>
+            </a:pPr>
+            <a:r>
+              <a:rPr lang="en-US" sz="3100" dirty="0"/>
+              <a:t>3 Different Room Themes</a:t>
             </a:r>
           </a:p>
           <a:p>
@@ -7544,14 +7555,178 @@
         </p:blipFill>
         <p:spPr>
           <a:xfrm>
-            <a:off x="5324315" y="1197840"/>
+            <a:off x="5324315" y="1208000"/>
             <a:ext cx="6197668" cy="4462320"/>
           </a:xfrm>
           <a:prstGeom prst="rect">
             <a:avLst/>
           </a:prstGeom>
         </p:spPr>
+        <p:style>
+          <a:lnRef idx="1">
+            <a:schemeClr val="dk1"/>
+          </a:lnRef>
+          <a:fillRef idx="0">
+            <a:schemeClr val="dk1"/>
+          </a:fillRef>
+          <a:effectRef idx="0">
+            <a:schemeClr val="dk1"/>
+          </a:effectRef>
+          <a:fontRef idx="minor">
+            <a:schemeClr val="tx1"/>
+          </a:fontRef>
+        </p:style>
       </p:pic>
+      <p:cxnSp>
+        <p:nvCxnSpPr>
+          <p:cNvPr id="4" name="Straight Connector 3">
+            <a:extLst>
+              <a:ext uri="{FF2B5EF4-FFF2-40B4-BE49-F238E27FC236}">
+                <a16:creationId xmlns:a16="http://schemas.microsoft.com/office/drawing/2014/main" id="{E86C30CC-A175-5C7F-DE7D-B7D32C63A6C2}"/>
+              </a:ext>
+            </a:extLst>
+          </p:cNvPr>
+          <p:cNvCxnSpPr>
+            <a:cxnSpLocks/>
+          </p:cNvCxnSpPr>
+          <p:nvPr/>
+        </p:nvCxnSpPr>
+        <p:spPr>
+          <a:xfrm>
+            <a:off x="6390640" y="1849120"/>
+            <a:ext cx="172720" cy="0"/>
+          </a:xfrm>
+          <a:prstGeom prst="line">
+            <a:avLst/>
+          </a:prstGeom>
+        </p:spPr>
+        <p:style>
+          <a:lnRef idx="1">
+            <a:schemeClr val="dk1"/>
+          </a:lnRef>
+          <a:fillRef idx="0">
+            <a:schemeClr val="dk1"/>
+          </a:fillRef>
+          <a:effectRef idx="0">
+            <a:schemeClr val="dk1"/>
+          </a:effectRef>
+          <a:fontRef idx="minor">
+            <a:schemeClr val="tx1"/>
+          </a:fontRef>
+        </p:style>
+      </p:cxnSp>
+      <p:cxnSp>
+        <p:nvCxnSpPr>
+          <p:cNvPr id="7" name="Straight Connector 6">
+            <a:extLst>
+              <a:ext uri="{FF2B5EF4-FFF2-40B4-BE49-F238E27FC236}">
+                <a16:creationId xmlns:a16="http://schemas.microsoft.com/office/drawing/2014/main" id="{270D3DEE-F0FE-223C-4C72-1CB810D3AAAB}"/>
+              </a:ext>
+            </a:extLst>
+          </p:cNvPr>
+          <p:cNvCxnSpPr>
+            <a:cxnSpLocks/>
+          </p:cNvCxnSpPr>
+          <p:nvPr/>
+        </p:nvCxnSpPr>
+        <p:spPr>
+          <a:xfrm>
+            <a:off x="6390640" y="4023360"/>
+            <a:ext cx="172720" cy="0"/>
+          </a:xfrm>
+          <a:prstGeom prst="line">
+            <a:avLst/>
+          </a:prstGeom>
+        </p:spPr>
+        <p:style>
+          <a:lnRef idx="1">
+            <a:schemeClr val="dk1"/>
+          </a:lnRef>
+          <a:fillRef idx="0">
+            <a:schemeClr val="dk1"/>
+          </a:fillRef>
+          <a:effectRef idx="0">
+            <a:schemeClr val="dk1"/>
+          </a:effectRef>
+          <a:fontRef idx="minor">
+            <a:schemeClr val="tx1"/>
+          </a:fontRef>
+        </p:style>
+      </p:cxnSp>
+      <p:cxnSp>
+        <p:nvCxnSpPr>
+          <p:cNvPr id="13" name="Straight Connector 12">
+            <a:extLst>
+              <a:ext uri="{FF2B5EF4-FFF2-40B4-BE49-F238E27FC236}">
+                <a16:creationId xmlns:a16="http://schemas.microsoft.com/office/drawing/2014/main" id="{D0EBE474-E456-1080-9049-6A0EC82FF5BB}"/>
+              </a:ext>
+            </a:extLst>
+          </p:cNvPr>
+          <p:cNvCxnSpPr/>
+          <p:nvPr/>
+        </p:nvCxnSpPr>
+        <p:spPr>
+          <a:xfrm>
+            <a:off x="8077200" y="4023360"/>
+            <a:ext cx="193040" cy="0"/>
+          </a:xfrm>
+          <a:prstGeom prst="line">
+            <a:avLst/>
+          </a:prstGeom>
+        </p:spPr>
+        <p:style>
+          <a:lnRef idx="1">
+            <a:schemeClr val="dk1"/>
+          </a:lnRef>
+          <a:fillRef idx="0">
+            <a:schemeClr val="dk1"/>
+          </a:fillRef>
+          <a:effectRef idx="0">
+            <a:schemeClr val="dk1"/>
+          </a:effectRef>
+          <a:fontRef idx="minor">
+            <a:schemeClr val="tx1"/>
+          </a:fontRef>
+        </p:style>
+      </p:cxnSp>
+      <p:cxnSp>
+        <p:nvCxnSpPr>
+          <p:cNvPr id="15" name="Straight Connector 14">
+            <a:extLst>
+              <a:ext uri="{FF2B5EF4-FFF2-40B4-BE49-F238E27FC236}">
+                <a16:creationId xmlns:a16="http://schemas.microsoft.com/office/drawing/2014/main" id="{6CBD965F-67D5-57BA-B9C7-02C84F424734}"/>
+              </a:ext>
+            </a:extLst>
+          </p:cNvPr>
+          <p:cNvCxnSpPr>
+            <a:cxnSpLocks/>
+          </p:cNvCxnSpPr>
+          <p:nvPr/>
+        </p:nvCxnSpPr>
+        <p:spPr>
+          <a:xfrm>
+            <a:off x="9712960" y="4023360"/>
+            <a:ext cx="223520" cy="0"/>
+          </a:xfrm>
+          <a:prstGeom prst="line">
+            <a:avLst/>
+          </a:prstGeom>
+        </p:spPr>
+        <p:style>
+          <a:lnRef idx="1">
+            <a:schemeClr val="dk1"/>
+          </a:lnRef>
+          <a:fillRef idx="0">
+            <a:schemeClr val="dk1"/>
+          </a:fillRef>
+          <a:effectRef idx="0">
+            <a:schemeClr val="dk1"/>
+          </a:effectRef>
+          <a:fontRef idx="minor">
+            <a:schemeClr val="tx1"/>
+          </a:fontRef>
+        </p:style>
+      </p:cxnSp>
     </p:spTree>
     <p:extLst>
       <p:ext uri="{BB962C8B-B14F-4D97-AF65-F5344CB8AC3E}">
@@ -7791,6 +7966,116 @@
           </a:prstGeom>
         </p:spPr>
       </p:pic>
+      <p:cxnSp>
+        <p:nvCxnSpPr>
+          <p:cNvPr id="4" name="Straight Connector 3">
+            <a:extLst>
+              <a:ext uri="{FF2B5EF4-FFF2-40B4-BE49-F238E27FC236}">
+                <a16:creationId xmlns:a16="http://schemas.microsoft.com/office/drawing/2014/main" id="{F72ECE2C-7192-093E-5D64-8412727AE5E8}"/>
+              </a:ext>
+            </a:extLst>
+          </p:cNvPr>
+          <p:cNvCxnSpPr>
+            <a:cxnSpLocks/>
+          </p:cNvCxnSpPr>
+          <p:nvPr/>
+        </p:nvCxnSpPr>
+        <p:spPr>
+          <a:xfrm>
+            <a:off x="6360160" y="3312160"/>
+            <a:ext cx="254000" cy="0"/>
+          </a:xfrm>
+          <a:prstGeom prst="line">
+            <a:avLst/>
+          </a:prstGeom>
+        </p:spPr>
+        <p:style>
+          <a:lnRef idx="1">
+            <a:schemeClr val="dk1"/>
+          </a:lnRef>
+          <a:fillRef idx="0">
+            <a:schemeClr val="dk1"/>
+          </a:fillRef>
+          <a:effectRef idx="0">
+            <a:schemeClr val="dk1"/>
+          </a:effectRef>
+          <a:fontRef idx="minor">
+            <a:schemeClr val="tx1"/>
+          </a:fontRef>
+        </p:style>
+      </p:cxnSp>
+      <p:cxnSp>
+        <p:nvCxnSpPr>
+          <p:cNvPr id="8" name="Straight Connector 7">
+            <a:extLst>
+              <a:ext uri="{FF2B5EF4-FFF2-40B4-BE49-F238E27FC236}">
+                <a16:creationId xmlns:a16="http://schemas.microsoft.com/office/drawing/2014/main" id="{0582809C-2B61-893F-9504-55F2FF231659}"/>
+              </a:ext>
+            </a:extLst>
+          </p:cNvPr>
+          <p:cNvCxnSpPr/>
+          <p:nvPr/>
+        </p:nvCxnSpPr>
+        <p:spPr>
+          <a:xfrm>
+            <a:off x="8046720" y="3312160"/>
+            <a:ext cx="203200" cy="0"/>
+          </a:xfrm>
+          <a:prstGeom prst="line">
+            <a:avLst/>
+          </a:prstGeom>
+        </p:spPr>
+        <p:style>
+          <a:lnRef idx="1">
+            <a:schemeClr val="dk1"/>
+          </a:lnRef>
+          <a:fillRef idx="0">
+            <a:schemeClr val="dk1"/>
+          </a:fillRef>
+          <a:effectRef idx="0">
+            <a:schemeClr val="dk1"/>
+          </a:effectRef>
+          <a:fontRef idx="minor">
+            <a:schemeClr val="tx1"/>
+          </a:fontRef>
+        </p:style>
+      </p:cxnSp>
+      <p:cxnSp>
+        <p:nvCxnSpPr>
+          <p:cNvPr id="11" name="Straight Connector 10">
+            <a:extLst>
+              <a:ext uri="{FF2B5EF4-FFF2-40B4-BE49-F238E27FC236}">
+                <a16:creationId xmlns:a16="http://schemas.microsoft.com/office/drawing/2014/main" id="{12338D0F-1679-537E-772B-3252DC5CC423}"/>
+              </a:ext>
+            </a:extLst>
+          </p:cNvPr>
+          <p:cNvCxnSpPr/>
+          <p:nvPr/>
+        </p:nvCxnSpPr>
+        <p:spPr>
+          <a:xfrm>
+            <a:off x="9712960" y="2418080"/>
+            <a:ext cx="182880" cy="0"/>
+          </a:xfrm>
+          <a:prstGeom prst="line">
+            <a:avLst/>
+          </a:prstGeom>
+        </p:spPr>
+        <p:style>
+          <a:lnRef idx="1">
+            <a:schemeClr val="dk1"/>
+          </a:lnRef>
+          <a:fillRef idx="0">
+            <a:schemeClr val="dk1"/>
+          </a:fillRef>
+          <a:effectRef idx="0">
+            <a:schemeClr val="dk1"/>
+          </a:effectRef>
+          <a:fontRef idx="minor">
+            <a:schemeClr val="tx1"/>
+          </a:fontRef>
+        </p:style>
+      </p:cxnSp>
     </p:spTree>
     <p:extLst>
       <p:ext uri="{BB962C8B-B14F-4D97-AF65-F5344CB8AC3E}">

</xml_diff>